<commit_message>
Added new figure 1.1
</commit_message>
<xml_diff>
--- a/2015-1115-defense.pptx
+++ b/2015-1115-defense.pptx
@@ -6,7 +6,8 @@
   </p:sldMasterIdLst>
   <p:sldIdLst>
     <p:sldId id="256" r:id="rId2"/>
-    <p:sldId id="257" r:id="rId3"/>
+    <p:sldId id="258" r:id="rId3"/>
+    <p:sldId id="257" r:id="rId4"/>
   </p:sldIdLst>
   <p:sldSz cx="9144000" cy="6858000" type="screen4x3"/>
   <p:notesSz cx="6858000" cy="9144000"/>
@@ -3338,6 +3339,126 @@
 </file>
 
 <file path=ppt/slides/slide2.xml><?xml version="1.0" encoding="utf-8"?>
+<p:sld xmlns:a="http://schemas.openxmlformats.org/drawingml/2006/main" xmlns:r="http://schemas.openxmlformats.org/officeDocument/2006/relationships" xmlns:p="http://schemas.openxmlformats.org/presentationml/2006/main">
+  <p:cSld>
+    <p:spTree>
+      <p:nvGrpSpPr>
+        <p:cNvPr id="1" name=""/>
+        <p:cNvGrpSpPr/>
+        <p:nvPr/>
+      </p:nvGrpSpPr>
+      <p:grpSpPr>
+        <a:xfrm>
+          <a:off x="0" y="0"/>
+          <a:ext cx="0" cy="0"/>
+          <a:chOff x="0" y="0"/>
+          <a:chExt cx="0" cy="0"/>
+        </a:xfrm>
+      </p:grpSpPr>
+      <p:sp>
+        <p:nvSpPr>
+          <p:cNvPr id="2" name="Title 1"/>
+          <p:cNvSpPr>
+            <a:spLocks noGrp="1"/>
+          </p:cNvSpPr>
+          <p:nvPr>
+            <p:ph type="title"/>
+          </p:nvPr>
+        </p:nvSpPr>
+        <p:spPr>
+          <a:xfrm>
+            <a:off x="457200" y="-76200"/>
+            <a:ext cx="8229600" cy="1143000"/>
+          </a:xfrm>
+        </p:spPr>
+        <p:txBody>
+          <a:bodyPr>
+            <a:normAutofit fontScale="90000"/>
+          </a:bodyPr>
+          <a:lstStyle/>
+          <a:p>
+            <a:r>
+              <a:rPr lang="en-US" dirty="0" smtClean="0"/>
+              <a:t>Null Distribution &amp; Rejection Region</a:t>
+            </a:r>
+            <a:endParaRPr lang="en-US" dirty="0"/>
+          </a:p>
+        </p:txBody>
+      </p:sp>
+      <p:sp>
+        <p:nvSpPr>
+          <p:cNvPr id="3" name="Content Placeholder 2"/>
+          <p:cNvSpPr>
+            <a:spLocks noGrp="1"/>
+          </p:cNvSpPr>
+          <p:nvPr>
+            <p:ph idx="1"/>
+          </p:nvPr>
+        </p:nvSpPr>
+        <p:spPr/>
+        <p:txBody>
+          <a:bodyPr/>
+          <a:lstStyle/>
+          <a:p>
+            <a:endParaRPr lang="en-US"/>
+          </a:p>
+        </p:txBody>
+      </p:sp>
+      <p:pic>
+        <p:nvPicPr>
+          <p:cNvPr id="2050" name="Picture 2" descr="C:\Users\Sangin\Dropbox\PhD-Dissertation\Data-analysis\ch1-figures\Fig1_1 Testing Hypothesis.png"/>
+          <p:cNvPicPr>
+            <a:picLocks noChangeAspect="1" noChangeArrowheads="1"/>
+          </p:cNvPicPr>
+          <p:nvPr/>
+        </p:nvPicPr>
+        <p:blipFill>
+          <a:blip r:embed="rId2">
+            <a:extLst>
+              <a:ext uri="{28A0092B-C50C-407E-A947-70E740481C1C}">
+                <a14:useLocalDpi xmlns:a14="http://schemas.microsoft.com/office/drawing/2010/main" val="0"/>
+              </a:ext>
+            </a:extLst>
+          </a:blip>
+          <a:srcRect/>
+          <a:stretch>
+            <a:fillRect/>
+          </a:stretch>
+        </p:blipFill>
+        <p:spPr bwMode="auto">
+          <a:xfrm>
+            <a:off x="0" y="1008888"/>
+            <a:ext cx="9144000" cy="5772912"/>
+          </a:xfrm>
+          <a:prstGeom prst="rect">
+            <a:avLst/>
+          </a:prstGeom>
+          <a:noFill/>
+          <a:extLst>
+            <a:ext uri="{909E8E84-426E-40DD-AFC4-6F175D3DCCD1}">
+              <a14:hiddenFill xmlns:a14="http://schemas.microsoft.com/office/drawing/2010/main">
+                <a:solidFill>
+                  <a:srgbClr val="FFFFFF"/>
+                </a:solidFill>
+              </a14:hiddenFill>
+            </a:ext>
+          </a:extLst>
+        </p:spPr>
+      </p:pic>
+    </p:spTree>
+    <p:extLst>
+      <p:ext uri="{BB962C8B-B14F-4D97-AF65-F5344CB8AC3E}">
+        <p14:creationId xmlns:p14="http://schemas.microsoft.com/office/powerpoint/2010/main" val="1135405282"/>
+      </p:ext>
+    </p:extLst>
+  </p:cSld>
+  <p:clrMapOvr>
+    <a:masterClrMapping/>
+  </p:clrMapOvr>
+</p:sld>
+</file>
+
+<file path=ppt/slides/slide3.xml><?xml version="1.0" encoding="utf-8"?>
 <p:sld xmlns:a="http://schemas.openxmlformats.org/drawingml/2006/main" xmlns:r="http://schemas.openxmlformats.org/officeDocument/2006/relationships" xmlns:p="http://schemas.openxmlformats.org/presentationml/2006/main">
   <p:cSld>
     <p:spTree>

</xml_diff>